<commit_message>
slopes, estimate LM for abundance
</commit_message>
<xml_diff>
--- a/FullModel_April23.pptx
+++ b/FullModel_April23.pptx
@@ -6878,7 +6878,7 @@
           <p:nvPr>
             <p:extLst>
               <p:ext uri="{D42A27DB-BD31-4B8C-83A1-F6EECF244321}">
-                <p14:modId xmlns:p14="http://schemas.microsoft.com/office/powerpoint/2010/main" val="1131696007"/>
+                <p14:modId xmlns:p14="http://schemas.microsoft.com/office/powerpoint/2010/main" val="3366898813"/>
               </p:ext>
             </p:extLst>
           </p:nvPr>
@@ -7298,9 +7298,10 @@
                     <a:lstStyle/>
                     <a:p>
                       <a:r>
-                        <a:rPr lang="en-US" dirty="0"/>
-                        <a:t>In progress</a:t>
+                        <a:rPr lang="en-US"/>
+                        <a:t>24346.6</a:t>
                       </a:r>
+                      <a:endParaRPr lang="en-US" dirty="0"/>
                     </a:p>
                   </a:txBody>
                   <a:tcPr>

</xml_diff>